<commit_message>
Add desgin to presentation
</commit_message>
<xml_diff>
--- a/docs/project-presentation.pptx
+++ b/docs/project-presentation.pptx
@@ -641,6 +641,98 @@
 </file>
 
 <file path=ppt/notesSlides/notesSlide3.xml><?xml version="1.0" encoding="utf-8"?>
+<p:notes xmlns:a="http://schemas.openxmlformats.org/drawingml/2006/main" xmlns:r="http://schemas.openxmlformats.org/officeDocument/2006/relationships" xmlns:p="http://schemas.openxmlformats.org/presentationml/2006/main">
+  <p:cSld>
+    <p:spTree>
+      <p:nvGrpSpPr>
+        <p:cNvPr id="1" name=""/>
+        <p:cNvGrpSpPr/>
+        <p:nvPr/>
+      </p:nvGrpSpPr>
+      <p:grpSpPr>
+        <a:xfrm>
+          <a:off x="0" y="0"/>
+          <a:ext cx="0" cy="0"/>
+          <a:chOff x="0" y="0"/>
+          <a:chExt cx="0" cy="0"/>
+        </a:xfrm>
+      </p:grpSpPr>
+      <p:sp>
+        <p:nvSpPr>
+          <p:cNvPr id="2" name="Folienbildplatzhalter 1"/>
+          <p:cNvSpPr>
+            <a:spLocks noGrp="1" noRot="1" noChangeAspect="1"/>
+          </p:cNvSpPr>
+          <p:nvPr>
+            <p:ph type="sldImg"/>
+          </p:nvPr>
+        </p:nvSpPr>
+        <p:spPr/>
+      </p:sp>
+      <p:sp>
+        <p:nvSpPr>
+          <p:cNvPr id="3" name="Notizenplatzhalter 2"/>
+          <p:cNvSpPr>
+            <a:spLocks noGrp="1"/>
+          </p:cNvSpPr>
+          <p:nvPr>
+            <p:ph type="body" idx="1"/>
+          </p:nvPr>
+        </p:nvSpPr>
+        <p:spPr/>
+        <p:txBody>
+          <a:bodyPr/>
+          <a:lstStyle/>
+          <a:p>
+            <a:r>
+              <a:rPr lang="de-AT" dirty="0"/>
+              <a:t>~ 40.000€</a:t>
+            </a:r>
+            <a:r>
+              <a:rPr lang="de-AT" baseline="0" dirty="0"/>
+              <a:t> an Gehältern im Falle einer Auszahlung</a:t>
+            </a:r>
+            <a:endParaRPr lang="de-AT" dirty="0"/>
+          </a:p>
+        </p:txBody>
+      </p:sp>
+      <p:sp>
+        <p:nvSpPr>
+          <p:cNvPr id="4" name="Foliennummernplatzhalter 3"/>
+          <p:cNvSpPr>
+            <a:spLocks noGrp="1"/>
+          </p:cNvSpPr>
+          <p:nvPr>
+            <p:ph type="sldNum" sz="quarter" idx="10"/>
+          </p:nvPr>
+        </p:nvSpPr>
+        <p:spPr/>
+        <p:txBody>
+          <a:bodyPr/>
+          <a:lstStyle/>
+          <a:p>
+            <a:fld id="{AE9E2D04-15C4-4177-9014-09E8AC06E589}" type="slidenum">
+              <a:rPr lang="de-DE" smtClean="0"/>
+              <a:t>7</a:t>
+            </a:fld>
+            <a:endParaRPr lang="de-DE"/>
+          </a:p>
+        </p:txBody>
+      </p:sp>
+    </p:spTree>
+    <p:extLst>
+      <p:ext uri="{BB962C8B-B14F-4D97-AF65-F5344CB8AC3E}">
+        <p14:creationId xmlns:p14="http://schemas.microsoft.com/office/powerpoint/2010/main" val="1998366173"/>
+      </p:ext>
+    </p:extLst>
+  </p:cSld>
+  <p:clrMapOvr>
+    <a:masterClrMapping/>
+  </p:clrMapOvr>
+</p:notes>
+</file>
+
+<file path=ppt/notesSlides/notesSlide4.xml><?xml version="1.0" encoding="utf-8"?>
 <p:notes xmlns:a="http://schemas.openxmlformats.org/drawingml/2006/main" xmlns:r="http://schemas.openxmlformats.org/officeDocument/2006/relationships" xmlns:p="http://schemas.openxmlformats.org/presentationml/2006/main">
   <p:cSld>
     <p:spTree>
@@ -4204,19 +4296,7 @@
               <a:rPr lang="de-AT" dirty="0">
                 <a:latin typeface="Gill Sans MT (Textkörper)"/>
               </a:rPr>
-              <a:t>Wird der Spieler besiegt, verliert er den aktuellen Charakter und muss von Vorne beginnen, behält</a:t>
-            </a:r>
-            <a:r>
-              <a:rPr lang="DE-AT" dirty="0">
-                <a:latin typeface="Gill Sans MT (Textkörper)"/>
-              </a:rPr>
-              <a:t> </a:t>
-            </a:r>
-            <a:r>
-              <a:rPr lang="de-AT" dirty="0">
-                <a:latin typeface="Gill Sans MT (Textkörper)"/>
-              </a:rPr>
-              <a:t>allerdings seine Punkte um im späteren Verlauf weitere Gegenstände freizuschalten.</a:t>
+              <a:t>Wird der Spieler besiegt, verliert er den aktuellen Charakter und muss von Vorne beginnen, erhält aber Punkte um im späteren Verlauf weitere Gegenstände freizuschalten.</a:t>
             </a:r>
             <a:endParaRPr lang="DE-AT" dirty="0">
               <a:latin typeface="Gill Sans MT (Textkörper)"/>
@@ -4654,7 +4734,7 @@
           <a:p>
             <a:r>
               <a:rPr lang="de-AT" dirty="0"/>
-              <a:t>Gewinn</a:t>
+              <a:t>Gewinn					=&gt; Umsatz in €</a:t>
             </a:r>
             <a:endParaRPr lang="DE-AT" dirty="0"/>
           </a:p>
@@ -4670,7 +4750,7 @@
             </a:r>
             <a:r>
               <a:rPr lang="DE-AT" dirty="0"/>
-              <a:t>	=&gt; ~ 1.360.000€</a:t>
+              <a:t>	=&gt; ~ 1.360.000</a:t>
             </a:r>
             <a:endParaRPr lang="de-AT" dirty="0"/>
           </a:p>
@@ -4692,21 +4772,21 @@
             <a:pPr lvl="1"/>
             <a:r>
               <a:rPr lang="DE-AT" dirty="0"/>
-              <a:t>Titan Souls 170.000 Spieler (14.99€)		=&gt; ~ 1.650.000€</a:t>
+              <a:t>Titan Souls 170.000 Spieler (14.99€)		=&gt; ~ 1.650.000</a:t>
             </a:r>
           </a:p>
           <a:p>
             <a:pPr lvl="1"/>
             <a:r>
               <a:rPr lang="DE-AT" dirty="0"/>
-              <a:t>Dungeon Souls 35.000 Spieler (12.99€)		=&gt; ~ 300.000€</a:t>
+              <a:t>Dungeon Souls 35.000 Spieler (12.99€)		=&gt; ~ 300.000</a:t>
             </a:r>
           </a:p>
           <a:p>
             <a:pPr lvl="1"/>
             <a:r>
               <a:rPr lang="DE-AT" dirty="0"/>
-              <a:t>Enter the Gungeon 414.000 Spieler (14.99€)	=&gt; ~ 4.095.000€</a:t>
+              <a:t>Enter the Gungeon 414.000 Spieler (14.99€)	=&gt; ~ 4.095.000</a:t>
             </a:r>
           </a:p>
         </p:txBody>

</xml_diff>

<commit_message>
Change description in presentation
</commit_message>
<xml_diff>
--- a/docs/project-presentation.pptx
+++ b/docs/project-presentation.pptx
@@ -206,7 +206,7 @@
           <a:p>
             <a:fld id="{ABC5BD08-9176-454C-BA7E-F69ACBDCE918}" type="datetimeFigureOut">
               <a:rPr lang="de-DE"/>
-              <a:t>26.09.2016</a:t>
+              <a:t>27.09.2016</a:t>
             </a:fld>
             <a:endParaRPr lang="de-DE"/>
           </a:p>
@@ -980,7 +980,7 @@
           <a:p>
             <a:fld id="{F2DD08D9-7444-4DFB-8F1F-9B0CBC03251A}" type="datetimeFigureOut">
               <a:rPr lang="de-AT" smtClean="0"/>
-              <a:t>26.09.2016</a:t>
+              <a:t>27.09.2016</a:t>
             </a:fld>
             <a:endParaRPr lang="de-AT"/>
           </a:p>
@@ -1153,7 +1153,7 @@
           <a:p>
             <a:fld id="{F2DD08D9-7444-4DFB-8F1F-9B0CBC03251A}" type="datetimeFigureOut">
               <a:rPr lang="de-AT" smtClean="0"/>
-              <a:t>26.09.2016</a:t>
+              <a:t>27.09.2016</a:t>
             </a:fld>
             <a:endParaRPr lang="de-AT"/>
           </a:p>
@@ -1336,7 +1336,7 @@
           <a:p>
             <a:fld id="{F2DD08D9-7444-4DFB-8F1F-9B0CBC03251A}" type="datetimeFigureOut">
               <a:rPr lang="de-AT" smtClean="0"/>
-              <a:t>26.09.2016</a:t>
+              <a:t>27.09.2016</a:t>
             </a:fld>
             <a:endParaRPr lang="de-AT"/>
           </a:p>
@@ -1509,7 +1509,7 @@
           <a:p>
             <a:fld id="{F2DD08D9-7444-4DFB-8F1F-9B0CBC03251A}" type="datetimeFigureOut">
               <a:rPr lang="de-AT" smtClean="0"/>
-              <a:t>26.09.2016</a:t>
+              <a:t>27.09.2016</a:t>
             </a:fld>
             <a:endParaRPr lang="de-AT"/>
           </a:p>
@@ -1780,7 +1780,7 @@
           <a:p>
             <a:fld id="{F2DD08D9-7444-4DFB-8F1F-9B0CBC03251A}" type="datetimeFigureOut">
               <a:rPr lang="de-AT" smtClean="0"/>
-              <a:t>26.09.2016</a:t>
+              <a:t>27.09.2016</a:t>
             </a:fld>
             <a:endParaRPr lang="de-AT"/>
           </a:p>
@@ -2015,7 +2015,7 @@
           <a:p>
             <a:fld id="{F2DD08D9-7444-4DFB-8F1F-9B0CBC03251A}" type="datetimeFigureOut">
               <a:rPr lang="de-AT" smtClean="0"/>
-              <a:t>26.09.2016</a:t>
+              <a:t>27.09.2016</a:t>
             </a:fld>
             <a:endParaRPr lang="de-AT"/>
           </a:p>
@@ -2377,7 +2377,7 @@
           <a:p>
             <a:fld id="{F2DD08D9-7444-4DFB-8F1F-9B0CBC03251A}" type="datetimeFigureOut">
               <a:rPr lang="de-AT" smtClean="0"/>
-              <a:t>26.09.2016</a:t>
+              <a:t>27.09.2016</a:t>
             </a:fld>
             <a:endParaRPr lang="de-AT"/>
           </a:p>
@@ -2521,7 +2521,7 @@
           <a:p>
             <a:fld id="{F2DD08D9-7444-4DFB-8F1F-9B0CBC03251A}" type="datetimeFigureOut">
               <a:rPr lang="de-AT" smtClean="0"/>
-              <a:t>26.09.2016</a:t>
+              <a:t>27.09.2016</a:t>
             </a:fld>
             <a:endParaRPr lang="de-AT"/>
           </a:p>
@@ -2619,7 +2619,7 @@
           <a:p>
             <a:fld id="{F2DD08D9-7444-4DFB-8F1F-9B0CBC03251A}" type="datetimeFigureOut">
               <a:rPr lang="de-AT" smtClean="0"/>
-              <a:t>26.09.2016</a:t>
+              <a:t>27.09.2016</a:t>
             </a:fld>
             <a:endParaRPr lang="de-AT"/>
           </a:p>
@@ -2979,7 +2979,7 @@
           <a:p>
             <a:fld id="{F2DD08D9-7444-4DFB-8F1F-9B0CBC03251A}" type="datetimeFigureOut">
               <a:rPr lang="de-AT" smtClean="0"/>
-              <a:t>26.09.2016</a:t>
+              <a:t>27.09.2016</a:t>
             </a:fld>
             <a:endParaRPr lang="de-AT"/>
           </a:p>
@@ -3339,7 +3339,7 @@
           <a:p>
             <a:fld id="{F2DD08D9-7444-4DFB-8F1F-9B0CBC03251A}" type="datetimeFigureOut">
               <a:rPr lang="de-AT" smtClean="0"/>
-              <a:t>26.09.2016</a:t>
+              <a:t>27.09.2016</a:t>
             </a:fld>
             <a:endParaRPr lang="de-AT"/>
           </a:p>
@@ -3583,7 +3583,7 @@
           <a:p>
             <a:fld id="{F2DD08D9-7444-4DFB-8F1F-9B0CBC03251A}" type="datetimeFigureOut">
               <a:rPr lang="de-AT" smtClean="0"/>
-              <a:t>26.09.2016</a:t>
+              <a:t>27.09.2016</a:t>
             </a:fld>
             <a:endParaRPr lang="de-AT"/>
           </a:p>
@@ -4294,13 +4294,18 @@
           <a:lstStyle/>
           <a:p>
             <a:r>
-              <a:rPr lang="DE-AT" dirty="0">
+              <a:rPr lang="de-AT" dirty="0">
                 <a:latin typeface="Gill Sans MT (Textkörper)"/>
                 <a:ea typeface="Open Sans" panose="020B0606030504020204" pitchFamily="34" charset="0"/>
                 <a:cs typeface="Open Sans" panose="020B0606030504020204" pitchFamily="34" charset="0"/>
               </a:rPr>
-              <a:t>Kurzbeschreibung</a:t>
-            </a:r>
+              <a:t>Beschreibung</a:t>
+            </a:r>
+            <a:endParaRPr lang="DE-AT" dirty="0">
+              <a:latin typeface="Gill Sans MT (Textkörper)"/>
+              <a:ea typeface="Open Sans" panose="020B0606030504020204" pitchFamily="34" charset="0"/>
+              <a:cs typeface="Open Sans" panose="020B0606030504020204" pitchFamily="34" charset="0"/>
+            </a:endParaRPr>
           </a:p>
           <a:p>
             <a:r>
@@ -4427,7 +4432,7 @@
                 <a:ea typeface="DejaVu Serif" panose="02060603050605020204" pitchFamily="18" charset="0"/>
                 <a:cs typeface="DejaVu Serif" panose="02060603050605020204" pitchFamily="18" charset="0"/>
               </a:rPr>
-              <a:t>Kurzbeschreibung</a:t>
+              <a:t>Beschreibung</a:t>
             </a:r>
           </a:p>
         </p:txBody>
@@ -4453,19 +4458,61 @@
               <a:rPr lang="de-AT" dirty="0">
                 <a:latin typeface="Gill Sans MT (Textkörper)"/>
               </a:rPr>
-              <a:t>Der Spieler bewegt sich durch ein Level und kämpft gegen die dort angesiedelten Gegner.</a:t>
-            </a:r>
-          </a:p>
-          <a:p>
+              <a:t>Gameplay</a:t>
+            </a:r>
+          </a:p>
+          <a:p>
+            <a:pPr lvl="1"/>
             <a:r>
               <a:rPr lang="de-AT" dirty="0">
                 <a:latin typeface="Gill Sans MT (Textkörper)"/>
               </a:rPr>
-              <a:t>Wird der Spieler besiegt, verliert er den aktuellen Charakter und muss von vorne beginnen.</a:t>
-            </a:r>
-            <a:endParaRPr lang="DE-AT" dirty="0">
-              <a:latin typeface="Gill Sans MT (Textkörper)"/>
-            </a:endParaRPr>
+              <a:t>Top-Down</a:t>
+            </a:r>
+          </a:p>
+          <a:p>
+            <a:pPr lvl="1"/>
+            <a:r>
+              <a:rPr lang="de-AT" dirty="0">
+                <a:latin typeface="Gill Sans MT (Textkörper)"/>
+              </a:rPr>
+              <a:t>Roguelike</a:t>
+            </a:r>
+          </a:p>
+          <a:p>
+            <a:pPr lvl="1"/>
+            <a:r>
+              <a:rPr lang="de-AT" dirty="0">
+                <a:latin typeface="Gill Sans MT (Textkörper)"/>
+              </a:rPr>
+              <a:t>Bullethell</a:t>
+            </a:r>
+          </a:p>
+          <a:p>
+            <a:r>
+              <a:rPr lang="de-AT" dirty="0">
+                <a:latin typeface="Gill Sans MT (Textkörper)"/>
+              </a:rPr>
+              <a:t>Grafik</a:t>
+            </a:r>
+          </a:p>
+          <a:p>
+            <a:pPr lvl="1"/>
+            <a:r>
+              <a:rPr lang="de-AT" dirty="0">
+                <a:latin typeface="Gill Sans MT (Textkörper)"/>
+              </a:rPr>
+              <a:t>Pixel Elemente		(64/128)</a:t>
+            </a:r>
+          </a:p>
+          <a:p>
+            <a:pPr lvl="1"/>
+            <a:r>
+              <a:rPr lang="de-AT" dirty="0">
+                <a:latin typeface="Gill Sans MT (Textkörper)"/>
+              </a:rPr>
+              <a:t>Hochauflösende Umgebung</a:t>
+            </a:r>
           </a:p>
         </p:txBody>
       </p:sp>

</xml_diff>